<commit_message>
[UPDATE] PPT (use case)
</commit_message>
<xml_diff>
--- a/PWA-COM_v1.1.pptx
+++ b/PWA-COM_v1.1.pptx
@@ -121,6 +121,11 @@
       </a:defRPr>
     </a:lvl9pPr>
   </p:defaultTextStyle>
+  <p:extLst>
+    <p:ext uri="{EFAFB233-063F-42B5-8137-9DF3F51BA10A}">
+      <p15:sldGuideLst xmlns:p15="http://schemas.microsoft.com/office/powerpoint/2012/main"/>
+    </p:ext>
+  </p:extLst>
 </p:presentation>
 </file>
 
@@ -3399,7 +3404,7 @@
           <a:p>
             <a:fld id="{8DBF2EEE-2DB4-46E1-88C6-F83DBC7D8760}" type="datetimeFigureOut">
               <a:rPr lang="fr-FR" smtClean="0"/>
-              <a:t>17/05/2020</a:t>
+              <a:t>18/05/2020</a:t>
             </a:fld>
             <a:endParaRPr lang="fr-FR"/>
           </a:p>
@@ -3710,6 +3715,90 @@
           <a:bodyPr/>
           <a:lstStyle/>
           <a:p>
+            <a:endParaRPr lang="fr-FR" dirty="0"/>
+          </a:p>
+        </p:txBody>
+      </p:sp>
+      <p:sp>
+        <p:nvSpPr>
+          <p:cNvPr id="4" name="Espace réservé du numéro de diapositive 3"/>
+          <p:cNvSpPr>
+            <a:spLocks noGrp="1"/>
+          </p:cNvSpPr>
+          <p:nvPr>
+            <p:ph type="sldNum" sz="quarter" idx="5"/>
+          </p:nvPr>
+        </p:nvSpPr>
+        <p:spPr/>
+        <p:txBody>
+          <a:bodyPr/>
+          <a:lstStyle/>
+          <a:p>
+            <a:fld id="{AA103507-B205-4309-9332-F7C002F0E11F}" type="slidenum">
+              <a:rPr lang="fr-FR" smtClean="0"/>
+              <a:t>7</a:t>
+            </a:fld>
+            <a:endParaRPr lang="fr-FR"/>
+          </a:p>
+        </p:txBody>
+      </p:sp>
+    </p:spTree>
+    <p:extLst>
+      <p:ext uri="{BB962C8B-B14F-4D97-AF65-F5344CB8AC3E}">
+        <p14:creationId xmlns:p14="http://schemas.microsoft.com/office/powerpoint/2010/main" val="579252050"/>
+      </p:ext>
+    </p:extLst>
+  </p:cSld>
+  <p:clrMapOvr>
+    <a:masterClrMapping/>
+  </p:clrMapOvr>
+</p:notes>
+</file>
+
+<file path=ppt/notesSlides/notesSlide2.xml><?xml version="1.0" encoding="utf-8"?>
+<p:notes xmlns:a="http://schemas.openxmlformats.org/drawingml/2006/main" xmlns:r="http://schemas.openxmlformats.org/officeDocument/2006/relationships" xmlns:p="http://schemas.openxmlformats.org/presentationml/2006/main">
+  <p:cSld>
+    <p:spTree>
+      <p:nvGrpSpPr>
+        <p:cNvPr id="1" name=""/>
+        <p:cNvGrpSpPr/>
+        <p:nvPr/>
+      </p:nvGrpSpPr>
+      <p:grpSpPr>
+        <a:xfrm>
+          <a:off x="0" y="0"/>
+          <a:ext cx="0" cy="0"/>
+          <a:chOff x="0" y="0"/>
+          <a:chExt cx="0" cy="0"/>
+        </a:xfrm>
+      </p:grpSpPr>
+      <p:sp>
+        <p:nvSpPr>
+          <p:cNvPr id="2" name="Espace réservé de l'image des diapositives 1"/>
+          <p:cNvSpPr>
+            <a:spLocks noGrp="1" noRot="1" noChangeAspect="1"/>
+          </p:cNvSpPr>
+          <p:nvPr>
+            <p:ph type="sldImg"/>
+          </p:nvPr>
+        </p:nvSpPr>
+        <p:spPr/>
+      </p:sp>
+      <p:sp>
+        <p:nvSpPr>
+          <p:cNvPr id="3" name="Espace réservé des notes 2"/>
+          <p:cNvSpPr>
+            <a:spLocks noGrp="1"/>
+          </p:cNvSpPr>
+          <p:nvPr>
+            <p:ph type="body" idx="1"/>
+          </p:nvPr>
+        </p:nvSpPr>
+        <p:spPr/>
+        <p:txBody>
+          <a:bodyPr/>
+          <a:lstStyle/>
+          <a:p>
             <a:pPr marL="0" marR="0" lvl="0" indent="0" algn="l" defTabSz="914400" rtl="0" eaLnBrk="1" fontAlgn="auto" latinLnBrk="0" hangingPunct="1">
               <a:lnSpc>
                 <a:spcPct val="100000"/>
@@ -4058,7 +4147,7 @@
             <a:fld id="{08B9EBBA-996F-894A-B54A-D6246ED52CEA}" type="datetimeFigureOut">
               <a:rPr lang="en-US" dirty="0"/>
               <a:pPr/>
-              <a:t>5/17/2020</a:t>
+              <a:t>5/18/2020</a:t>
             </a:fld>
             <a:endParaRPr lang="en-US" dirty="0"/>
           </a:p>
@@ -4373,7 +4462,7 @@
             <a:fld id="{18C79C5D-2A6F-F04D-97DA-BEF2467B64E4}" type="datetimeFigureOut">
               <a:rPr lang="en-US" dirty="0"/>
               <a:pPr/>
-              <a:t>5/17/2020</a:t>
+              <a:t>5/18/2020</a:t>
             </a:fld>
             <a:endParaRPr lang="en-US" dirty="0"/>
           </a:p>
@@ -4858,7 +4947,7 @@
             <a:fld id="{8DFA1846-DA80-1C48-A609-854EA85C59AD}" type="datetimeFigureOut">
               <a:rPr lang="en-US" dirty="0"/>
               <a:pPr/>
-              <a:t>5/17/2020</a:t>
+              <a:t>5/18/2020</a:t>
             </a:fld>
             <a:endParaRPr lang="en-US" dirty="0"/>
           </a:p>
@@ -5224,7 +5313,7 @@
             <a:fld id="{FBF54567-0DE4-3F47-BF90-CB84690072F9}" type="datetimeFigureOut">
               <a:rPr lang="en-US" dirty="0"/>
               <a:pPr/>
-              <a:t>5/17/2020</a:t>
+              <a:t>5/18/2020</a:t>
             </a:fld>
             <a:endParaRPr lang="en-US" dirty="0"/>
           </a:p>
@@ -5494,7 +5583,7 @@
             <a:fld id="{C6C52C72-DE31-F449-A4ED-4C594FD91407}" type="datetimeFigureOut">
               <a:rPr lang="en-US" dirty="0"/>
               <a:pPr/>
-              <a:t>5/17/2020</a:t>
+              <a:t>5/18/2020</a:t>
             </a:fld>
             <a:endParaRPr lang="en-US" dirty="0"/>
           </a:p>
@@ -5776,7 +5865,7 @@
             <a:fld id="{ED62726E-379B-B349-9EED-81ED093FA806}" type="datetimeFigureOut">
               <a:rPr lang="en-US" dirty="0"/>
               <a:pPr/>
-              <a:t>5/17/2020</a:t>
+              <a:t>5/18/2020</a:t>
             </a:fld>
             <a:endParaRPr lang="en-US" dirty="0"/>
           </a:p>
@@ -6056,7 +6145,7 @@
             <a:fld id="{9B3A1323-8D79-1946-B0D7-40001CF92E9D}" type="datetimeFigureOut">
               <a:rPr lang="en-US" dirty="0"/>
               <a:pPr/>
-              <a:t>5/17/2020</a:t>
+              <a:t>5/18/2020</a:t>
             </a:fld>
             <a:endParaRPr lang="en-US" dirty="0"/>
           </a:p>
@@ -6396,7 +6485,7 @@
             <a:fld id="{8DFA1846-DA80-1C48-A609-854EA85C59AD}" type="datetimeFigureOut">
               <a:rPr lang="en-US" dirty="0"/>
               <a:pPr/>
-              <a:t>5/17/2020</a:t>
+              <a:t>5/18/2020</a:t>
             </a:fld>
             <a:endParaRPr lang="en-US" dirty="0"/>
           </a:p>
@@ -6732,7 +6821,7 @@
             <a:fld id="{57302355-E14B-8545-A8F8-0FE83CC9D524}" type="datetimeFigureOut">
               <a:rPr lang="en-US" dirty="0"/>
               <a:pPr/>
-              <a:t>5/17/2020</a:t>
+              <a:t>5/18/2020</a:t>
             </a:fld>
             <a:endParaRPr lang="en-US" dirty="0"/>
           </a:p>
@@ -7206,7 +7295,7 @@
             <a:fld id="{02640F58-564D-2B4F-AE67-E407BA4FCF45}" type="datetimeFigureOut">
               <a:rPr lang="en-US" dirty="0"/>
               <a:pPr/>
-              <a:t>5/17/2020</a:t>
+              <a:t>5/18/2020</a:t>
             </a:fld>
             <a:endParaRPr lang="en-US" dirty="0"/>
           </a:p>
@@ -7424,7 +7513,7 @@
             <a:fld id="{F13A34C8-038E-2045-AF43-DF7DBB8E0E9E}" type="datetimeFigureOut">
               <a:rPr lang="en-US" dirty="0"/>
               <a:pPr/>
-              <a:t>5/17/2020</a:t>
+              <a:t>5/18/2020</a:t>
             </a:fld>
             <a:endParaRPr lang="en-US" dirty="0"/>
           </a:p>
@@ -7516,7 +7605,7 @@
             <a:fld id="{8818C68F-D26B-8F47-958C-23B49CF8A634}" type="datetimeFigureOut">
               <a:rPr lang="en-US" dirty="0"/>
               <a:pPr/>
-              <a:t>5/17/2020</a:t>
+              <a:t>5/18/2020</a:t>
             </a:fld>
             <a:endParaRPr lang="en-US" dirty="0"/>
           </a:p>
@@ -7980,7 +8069,7 @@
             <a:fld id="{D0DF5E60-9974-AC48-9591-99C2BB44B7CF}" type="datetimeFigureOut">
               <a:rPr lang="en-US" dirty="0"/>
               <a:pPr/>
-              <a:t>5/17/2020</a:t>
+              <a:t>5/18/2020</a:t>
             </a:fld>
             <a:endParaRPr lang="en-US" dirty="0"/>
           </a:p>
@@ -8290,7 +8379,7 @@
             <a:fld id="{18C79C5D-2A6F-F04D-97DA-BEF2467B64E4}" type="datetimeFigureOut">
               <a:rPr lang="en-US" dirty="0"/>
               <a:pPr/>
-              <a:t>5/17/2020</a:t>
+              <a:t>5/18/2020</a:t>
             </a:fld>
             <a:endParaRPr lang="en-US" dirty="0"/>
           </a:p>
@@ -8557,7 +8646,7 @@
             <a:fld id="{09B482E8-6E0E-1B4F-B1FD-C69DB9E858D9}" type="datetimeFigureOut">
               <a:rPr lang="en-US" dirty="0"/>
               <a:pPr/>
-              <a:t>5/17/2020</a:t>
+              <a:t>5/18/2020</a:t>
             </a:fld>
             <a:endParaRPr lang="en-US" dirty="0"/>
           </a:p>
@@ -9152,6 +9241,53 @@
           </a:p>
         </p:txBody>
       </p:sp>
+      <p:pic>
+        <p:nvPicPr>
+          <p:cNvPr id="1026" name="Picture 2">
+            <a:extLst>
+              <a:ext uri="{FF2B5EF4-FFF2-40B4-BE49-F238E27FC236}">
+                <a16:creationId xmlns:a16="http://schemas.microsoft.com/office/drawing/2014/main" id="{34F2F82D-A9D0-43C9-9362-7E15F26C8F02}"/>
+              </a:ext>
+            </a:extLst>
+          </p:cNvPr>
+          <p:cNvPicPr>
+            <a:picLocks noChangeAspect="1" noChangeArrowheads="1"/>
+          </p:cNvPicPr>
+          <p:nvPr/>
+        </p:nvPicPr>
+        <p:blipFill>
+          <a:blip r:embed="rId3">
+            <a:extLst>
+              <a:ext uri="{28A0092B-C50C-407E-A947-70E740481C1C}">
+                <a14:useLocalDpi xmlns:a14="http://schemas.microsoft.com/office/drawing/2010/main" val="0"/>
+              </a:ext>
+            </a:extLst>
+          </a:blip>
+          <a:srcRect/>
+          <a:stretch>
+            <a:fillRect/>
+          </a:stretch>
+        </p:blipFill>
+        <p:spPr bwMode="auto">
+          <a:xfrm>
+            <a:off x="6376988" y="2353162"/>
+            <a:ext cx="4518971" cy="3934261"/>
+          </a:xfrm>
+          <a:prstGeom prst="rect">
+            <a:avLst/>
+          </a:prstGeom>
+          <a:noFill/>
+          <a:extLst>
+            <a:ext uri="{909E8E84-426E-40DD-AFC4-6F175D3DCCD1}">
+              <a14:hiddenFill xmlns:a14="http://schemas.microsoft.com/office/drawing/2010/main">
+                <a:solidFill>
+                  <a:srgbClr val="FFFFFF"/>
+                </a:solidFill>
+              </a14:hiddenFill>
+            </a:ext>
+          </a:extLst>
+        </p:spPr>
+      </p:pic>
     </p:spTree>
     <p:extLst>
       <p:ext uri="{BB962C8B-B14F-4D97-AF65-F5344CB8AC3E}">
@@ -9347,10 +9483,73 @@
           <a:bodyPr/>
           <a:lstStyle/>
           <a:p>
-            <a:endParaRPr lang="fr-FR" dirty="0"/>
-          </a:p>
-        </p:txBody>
-      </p:sp>
+            <a:r>
+              <a:rPr lang="fr-FR" dirty="0"/>
+              <a:t>Bonnes pratiques de l’audit</a:t>
+            </a:r>
+          </a:p>
+          <a:p>
+            <a:r>
+              <a:rPr lang="fr-FR" dirty="0"/>
+              <a:t>Localisation certaines fois inexacte</a:t>
+            </a:r>
+          </a:p>
+          <a:p>
+            <a:r>
+              <a:rPr lang="fr-FR" dirty="0"/>
+              <a:t>Travail à distance compliqué</a:t>
+            </a:r>
+          </a:p>
+          <a:p>
+            <a:r>
+              <a:rPr lang="fr-FR" dirty="0"/>
+              <a:t>Manque d’objectifs concrets</a:t>
+            </a:r>
+          </a:p>
+          <a:p>
+            <a:r>
+              <a:rPr lang="fr-FR" dirty="0"/>
+              <a:t>Diversité des technologies pour la création de PWA</a:t>
+            </a:r>
+          </a:p>
+          <a:p>
+            <a:r>
+              <a:rPr lang="fr-FR" dirty="0"/>
+              <a:t>Pas de framework mature</a:t>
+            </a:r>
+          </a:p>
+        </p:txBody>
+      </p:sp>
+      <p:pic>
+        <p:nvPicPr>
+          <p:cNvPr id="4" name="Image 3">
+            <a:extLst>
+              <a:ext uri="{FF2B5EF4-FFF2-40B4-BE49-F238E27FC236}">
+                <a16:creationId xmlns:a16="http://schemas.microsoft.com/office/drawing/2014/main" id="{F18ACD9C-9676-4BD9-8ECF-99C7EBAAC22F}"/>
+              </a:ext>
+            </a:extLst>
+          </p:cNvPr>
+          <p:cNvPicPr>
+            <a:picLocks noChangeAspect="1"/>
+          </p:cNvPicPr>
+          <p:nvPr/>
+        </p:nvPicPr>
+        <p:blipFill>
+          <a:blip r:embed="rId2"/>
+          <a:stretch>
+            <a:fillRect/>
+          </a:stretch>
+        </p:blipFill>
+        <p:spPr>
+          <a:xfrm>
+            <a:off x="8048624" y="2375995"/>
+            <a:ext cx="3590925" cy="912072"/>
+          </a:xfrm>
+          <a:prstGeom prst="rect">
+            <a:avLst/>
+          </a:prstGeom>
+        </p:spPr>
+      </p:pic>
     </p:spTree>
     <p:extLst>
       <p:ext uri="{BB962C8B-B14F-4D97-AF65-F5344CB8AC3E}">
@@ -9444,7 +9643,15 @@
           <a:p>
             <a:r>
               <a:rPr lang="fr-FR" dirty="0"/>
-              <a:t>Mode de réflexion (PWA, </a:t>
+              <a:t>Mode de réflexion </a:t>
+            </a:r>
+            <a:r>
+              <a:rPr lang="fr-FR"/>
+              <a:t>(utilisation PWA</a:t>
+            </a:r>
+            <a:r>
+              <a:rPr lang="fr-FR" dirty="0"/>
+              <a:t>, </a:t>
             </a:r>
             <a:r>
               <a:rPr lang="fr-FR" dirty="0" err="1"/>
@@ -9453,6 +9660,12 @@
             <a:r>
               <a:rPr lang="fr-FR" dirty="0"/>
               <a:t>, etc.)</a:t>
+            </a:r>
+          </a:p>
+          <a:p>
+            <a:r>
+              <a:rPr lang="fr-FR" dirty="0"/>
+              <a:t>Réflexe de l’audit</a:t>
             </a:r>
           </a:p>
         </p:txBody>
@@ -9536,7 +9749,10 @@
           <a:bodyPr/>
           <a:lstStyle/>
           <a:p>
-            <a:endParaRPr lang="fr-FR" dirty="0"/>
+            <a:r>
+              <a:rPr lang="fr-FR" dirty="0"/>
+              <a:t>Création d’un framework de bout en bout pour les PWA</a:t>
+            </a:r>
           </a:p>
         </p:txBody>
       </p:sp>
@@ -9982,36 +10198,41 @@
           <a:p>
             <a:r>
               <a:rPr lang="fr-FR" dirty="0"/>
-              <a:t>Diagrammes UML</a:t>
-            </a:r>
-          </a:p>
-        </p:txBody>
-      </p:sp>
-      <p:sp>
-        <p:nvSpPr>
-          <p:cNvPr id="3" name="Espace réservé du contenu 2">
+              <a:t>Use Case</a:t>
+            </a:r>
+          </a:p>
+        </p:txBody>
+      </p:sp>
+      <p:pic>
+        <p:nvPicPr>
+          <p:cNvPr id="5" name="Image 4">
             <a:extLst>
               <a:ext uri="{FF2B5EF4-FFF2-40B4-BE49-F238E27FC236}">
-                <a16:creationId xmlns:a16="http://schemas.microsoft.com/office/drawing/2014/main" id="{2AF2BB18-F830-4F72-A0A2-B7BEC5F0239D}"/>
+                <a16:creationId xmlns:a16="http://schemas.microsoft.com/office/drawing/2014/main" id="{6D30A839-5F8B-45DF-A62C-4D8EFFC544F0}"/>
               </a:ext>
             </a:extLst>
           </p:cNvPr>
-          <p:cNvSpPr>
-            <a:spLocks noGrp="1"/>
-          </p:cNvSpPr>
-          <p:nvPr>
-            <p:ph idx="1"/>
-          </p:nvPr>
-        </p:nvSpPr>
-        <p:spPr/>
-        <p:txBody>
-          <a:bodyPr/>
-          <a:lstStyle/>
-          <a:p>
-            <a:endParaRPr lang="fr-FR" dirty="0"/>
-          </a:p>
-        </p:txBody>
-      </p:sp>
+          <p:cNvPicPr>
+            <a:picLocks noChangeAspect="1"/>
+          </p:cNvPicPr>
+          <p:nvPr/>
+        </p:nvPicPr>
+        <p:blipFill>
+          <a:blip r:embed="rId3"/>
+          <a:stretch>
+            <a:fillRect/>
+          </a:stretch>
+        </p:blipFill>
+        <p:spPr>
+          <a:xfrm>
+            <a:off x="1076701" y="2343151"/>
+            <a:ext cx="5676524" cy="4333893"/>
+          </a:xfrm>
+          <a:prstGeom prst="rect">
+            <a:avLst/>
+          </a:prstGeom>
+        </p:spPr>
+      </p:pic>
     </p:spTree>
     <p:extLst>
       <p:ext uri="{BB962C8B-B14F-4D97-AF65-F5344CB8AC3E}">

</xml_diff>

<commit_message>
[UPDATE] PPT (screen + XP)
</commit_message>
<xml_diff>
--- a/PWA-COM_v1.1.pptx
+++ b/PWA-COM_v1.1.pptx
@@ -3954,7 +3954,7 @@
           <a:effectLst/>
           <a:extLst>
             <a:ext uri="{91240B29-F687-4f45-9708-019B960494DF}">
-              <a14:hiddenLine xmlns:a14="http://schemas.microsoft.com/office/drawing/2010/main" xmlns="" w="9525">
+              <a14:hiddenLine xmlns="" xmlns:a14="http://schemas.microsoft.com/office/drawing/2010/main" w="9525">
                 <a:solidFill>
                   <a:srgbClr val="000000"/>
                 </a:solidFill>
@@ -5460,7 +5460,7 @@
           <a:ln/>
           <a:extLst>
             <a:ext uri="{91240B29-F687-4f45-9708-019B960494DF}">
-              <a14:hiddenLine xmlns:a14="http://schemas.microsoft.com/office/drawing/2010/main" xmlns="" w="9525">
+              <a14:hiddenLine xmlns="" xmlns:a14="http://schemas.microsoft.com/office/drawing/2010/main" w="9525">
                 <a:solidFill>
                   <a:srgbClr val="000000"/>
                 </a:solidFill>
@@ -5731,7 +5731,7 @@
           <a:ln/>
           <a:extLst>
             <a:ext uri="{91240B29-F687-4f45-9708-019B960494DF}">
-              <a14:hiddenLine xmlns:a14="http://schemas.microsoft.com/office/drawing/2010/main" xmlns="" w="9525">
+              <a14:hiddenLine xmlns="" xmlns:a14="http://schemas.microsoft.com/office/drawing/2010/main" w="9525">
                 <a:solidFill>
                   <a:srgbClr val="000000"/>
                 </a:solidFill>
@@ -6010,7 +6010,7 @@
           <a:ln/>
           <a:extLst>
             <a:ext uri="{91240B29-F687-4f45-9708-019B960494DF}">
-              <a14:hiddenLine xmlns:a14="http://schemas.microsoft.com/office/drawing/2010/main" xmlns="" w="9525">
+              <a14:hiddenLine xmlns="" xmlns:a14="http://schemas.microsoft.com/office/drawing/2010/main" w="9525">
                 <a:solidFill>
                   <a:srgbClr val="000000"/>
                 </a:solidFill>
@@ -6628,7 +6628,7 @@
           <a:ln/>
           <a:extLst>
             <a:ext uri="{91240B29-F687-4f45-9708-019B960494DF}">
-              <a14:hiddenLine xmlns:a14="http://schemas.microsoft.com/office/drawing/2010/main" xmlns="" w="9525">
+              <a14:hiddenLine xmlns="" xmlns:a14="http://schemas.microsoft.com/office/drawing/2010/main" w="9525">
                 <a:solidFill>
                   <a:srgbClr val="000000"/>
                 </a:solidFill>
@@ -6963,7 +6963,7 @@
           <a:ln/>
           <a:extLst>
             <a:ext uri="{91240B29-F687-4f45-9708-019B960494DF}">
-              <a14:hiddenLine xmlns:a14="http://schemas.microsoft.com/office/drawing/2010/main" xmlns="" w="9525">
+              <a14:hiddenLine xmlns="" xmlns:a14="http://schemas.microsoft.com/office/drawing/2010/main" w="9525">
                 <a:solidFill>
                   <a:srgbClr val="000000"/>
                 </a:solidFill>
@@ -7436,7 +7436,7 @@
           <a:ln/>
           <a:extLst>
             <a:ext uri="{91240B29-F687-4f45-9708-019B960494DF}">
-              <a14:hiddenLine xmlns:a14="http://schemas.microsoft.com/office/drawing/2010/main" xmlns="" w="9525">
+              <a14:hiddenLine xmlns="" xmlns:a14="http://schemas.microsoft.com/office/drawing/2010/main" w="9525">
                 <a:solidFill>
                   <a:srgbClr val="000000"/>
                 </a:solidFill>
@@ -7857,7 +7857,7 @@
           <a:ln/>
           <a:extLst>
             <a:ext uri="{91240B29-F687-4f45-9708-019B960494DF}">
-              <a14:hiddenLine xmlns:a14="http://schemas.microsoft.com/office/drawing/2010/main" xmlns="" w="9525">
+              <a14:hiddenLine xmlns="" xmlns:a14="http://schemas.microsoft.com/office/drawing/2010/main" w="9525">
                 <a:solidFill>
                   <a:srgbClr val="000000"/>
                 </a:solidFill>
@@ -9466,7 +9466,7 @@
           <a:effectLst/>
           <a:extLst>
             <a:ext uri="{91240B29-F687-4f45-9708-019B960494DF}">
-              <a14:hiddenLine xmlns="" xmlns:a14="http://schemas.microsoft.com/office/drawing/2010/main" xmlns:a16="http://schemas.microsoft.com/office/drawing/2014/main" w="9525">
+              <a14:hiddenLine xmlns:a16="http://schemas.microsoft.com/office/drawing/2014/main" xmlns:a14="http://schemas.microsoft.com/office/drawing/2010/main" xmlns="" w="9525">
                 <a:solidFill>
                   <a:srgbClr val="000000"/>
                 </a:solidFill>
@@ -9789,7 +9789,7 @@
           <a:effectLst/>
           <a:extLst>
             <a:ext uri="{91240B29-F687-4f45-9708-019B960494DF}">
-              <a14:hiddenLine xmlns="" xmlns:a14="http://schemas.microsoft.com/office/drawing/2010/main" xmlns:p14="http://schemas.microsoft.com/office/powerpoint/2010/main" xmlns:a16="http://schemas.microsoft.com/office/drawing/2014/main" w="9525">
+              <a14:hiddenLine xmlns:a16="http://schemas.microsoft.com/office/drawing/2014/main" xmlns:p14="http://schemas.microsoft.com/office/powerpoint/2010/main" xmlns:a14="http://schemas.microsoft.com/office/drawing/2010/main" xmlns="" w="9525">
                 <a:solidFill>
                   <a:srgbClr val="000000"/>
                 </a:solidFill>
@@ -9984,7 +9984,7 @@
         </p:blipFill>
         <p:spPr>
           <a:xfrm>
-            <a:off x="6649818" y="2252438"/>
+            <a:off x="6611717" y="1173809"/>
             <a:ext cx="2461406" cy="2353121"/>
           </a:xfrm>
           <a:prstGeom prst="rect">
@@ -10039,6 +10039,51 @@
           </a:extLst>
         </p:spPr>
       </p:pic>
+      <p:pic>
+        <p:nvPicPr>
+          <p:cNvPr id="2" name="Picture 2">
+            <a:extLst>
+              <a:ext uri="{FF2B5EF4-FFF2-40B4-BE49-F238E27FC236}">
+                <a16:creationId xmlns:a16="http://schemas.microsoft.com/office/drawing/2014/main" id="{D884F666-AAB4-42DD-A047-B61F39EB64F1}"/>
+              </a:ext>
+            </a:extLst>
+          </p:cNvPr>
+          <p:cNvPicPr>
+            <a:picLocks noChangeAspect="1" noChangeArrowheads="1"/>
+          </p:cNvPicPr>
+          <p:nvPr/>
+        </p:nvPicPr>
+        <p:blipFill rotWithShape="1">
+          <a:blip r:embed="rId5">
+            <a:extLst>
+              <a:ext uri="{28A0092B-C50C-407E-A947-70E740481C1C}">
+                <a14:useLocalDpi xmlns:a14="http://schemas.microsoft.com/office/drawing/2010/main" val="0"/>
+              </a:ext>
+            </a:extLst>
+          </a:blip>
+          <a:srcRect t="38472" r="-337" b="31250"/>
+          <a:stretch/>
+        </p:blipFill>
+        <p:spPr bwMode="auto">
+          <a:xfrm>
+            <a:off x="6604998" y="4004196"/>
+            <a:ext cx="2468125" cy="1551325"/>
+          </a:xfrm>
+          <a:prstGeom prst="rect">
+            <a:avLst/>
+          </a:prstGeom>
+          <a:noFill/>
+          <a:extLst>
+            <a:ext uri="{909E8E84-426E-40DD-AFC4-6F175D3DCCD1}">
+              <a14:hiddenFill xmlns:a14="http://schemas.microsoft.com/office/drawing/2010/main">
+                <a:solidFill>
+                  <a:srgbClr val="FFFFFF"/>
+                </a:solidFill>
+              </a14:hiddenFill>
+            </a:ext>
+          </a:extLst>
+        </p:spPr>
+      </p:pic>
     </p:spTree>
     <p:extLst>
       <p:ext uri="{BB962C8B-B14F-4D97-AF65-F5344CB8AC3E}">
@@ -10172,7 +10217,7 @@
           <a:effectLst/>
           <a:extLst>
             <a:ext uri="{91240B29-F687-4f45-9708-019B960494DF}">
-              <a14:hiddenLine xmlns="" xmlns:a14="http://schemas.microsoft.com/office/drawing/2010/main" xmlns:a16="http://schemas.microsoft.com/office/drawing/2014/main" w="9525">
+              <a14:hiddenLine xmlns:a16="http://schemas.microsoft.com/office/drawing/2014/main" xmlns:a14="http://schemas.microsoft.com/office/drawing/2010/main" xmlns="" w="9525">
                 <a:solidFill>
                   <a:srgbClr val="000000"/>
                 </a:solidFill>
@@ -10495,7 +10540,7 @@
           <a:effectLst/>
           <a:extLst>
             <a:ext uri="{91240B29-F687-4f45-9708-019B960494DF}">
-              <a14:hiddenLine xmlns="" xmlns:a14="http://schemas.microsoft.com/office/drawing/2010/main" xmlns:p14="http://schemas.microsoft.com/office/powerpoint/2010/main" xmlns:a16="http://schemas.microsoft.com/office/drawing/2014/main" w="9525">
+              <a14:hiddenLine xmlns:a16="http://schemas.microsoft.com/office/drawing/2014/main" xmlns:p14="http://schemas.microsoft.com/office/powerpoint/2010/main" xmlns:a14="http://schemas.microsoft.com/office/drawing/2010/main" xmlns="" w="9525">
                 <a:solidFill>
                   <a:srgbClr val="000000"/>
                 </a:solidFill>
@@ -10886,15 +10931,7 @@
           <a:p>
             <a:r>
               <a:rPr lang="fr-FR" dirty="0"/>
-              <a:t>Mode de réflexion </a:t>
-            </a:r>
-            <a:r>
-              <a:rPr lang="fr-FR"/>
-              <a:t>(utilisation PWA</a:t>
-            </a:r>
-            <a:r>
-              <a:rPr lang="fr-FR" dirty="0"/>
-              <a:t>, </a:t>
+              <a:t>Mode de réflexion (utilisation PWA, </a:t>
             </a:r>
             <a:r>
               <a:rPr lang="fr-FR" dirty="0" err="1"/>
@@ -10909,6 +10946,20 @@
             <a:r>
               <a:rPr lang="fr-FR" dirty="0"/>
               <a:t>Réflexe de l’audit</a:t>
+            </a:r>
+          </a:p>
+          <a:p>
+            <a:r>
+              <a:rPr lang="fr-FR" dirty="0"/>
+              <a:t>Utilisation </a:t>
+            </a:r>
+            <a:r>
+              <a:rPr lang="fr-FR"/>
+              <a:t>de différentes fonctions </a:t>
+            </a:r>
+            <a:r>
+              <a:rPr lang="fr-FR" dirty="0"/>
+              <a:t>natives</a:t>
             </a:r>
           </a:p>
         </p:txBody>
@@ -11479,7 +11530,7 @@
           <a:effectLst/>
           <a:extLst>
             <a:ext uri="{91240B29-F687-4f45-9708-019B960494DF}">
-              <a14:hiddenLine xmlns="" xmlns:a14="http://schemas.microsoft.com/office/drawing/2010/main" xmlns:a16="http://schemas.microsoft.com/office/drawing/2014/main" w="9525">
+              <a14:hiddenLine xmlns:a16="http://schemas.microsoft.com/office/drawing/2014/main" xmlns:a14="http://schemas.microsoft.com/office/drawing/2010/main" xmlns="" w="9525">
                 <a:solidFill>
                   <a:srgbClr val="000000"/>
                 </a:solidFill>
@@ -11802,7 +11853,7 @@
           <a:effectLst/>
           <a:extLst>
             <a:ext uri="{91240B29-F687-4f45-9708-019B960494DF}">
-              <a14:hiddenLine xmlns="" xmlns:a14="http://schemas.microsoft.com/office/drawing/2010/main" xmlns:p14="http://schemas.microsoft.com/office/powerpoint/2010/main" xmlns:a16="http://schemas.microsoft.com/office/drawing/2014/main" w="9525">
+              <a14:hiddenLine xmlns:a16="http://schemas.microsoft.com/office/drawing/2014/main" xmlns:p14="http://schemas.microsoft.com/office/powerpoint/2010/main" xmlns:a14="http://schemas.microsoft.com/office/drawing/2010/main" xmlns="" w="9525">
                 <a:solidFill>
                   <a:srgbClr val="000000"/>
                 </a:solidFill>
@@ -12313,7 +12364,7 @@
           <a:effectLst/>
           <a:extLst>
             <a:ext uri="{91240B29-F687-4f45-9708-019B960494DF}">
-              <a14:hiddenLine xmlns="" xmlns:a14="http://schemas.microsoft.com/office/drawing/2010/main" xmlns:a16="http://schemas.microsoft.com/office/drawing/2014/main" w="9525">
+              <a14:hiddenLine xmlns:a16="http://schemas.microsoft.com/office/drawing/2014/main" xmlns:a14="http://schemas.microsoft.com/office/drawing/2010/main" xmlns="" w="9525">
                 <a:solidFill>
                   <a:srgbClr val="000000"/>
                 </a:solidFill>
@@ -12636,7 +12687,7 @@
           <a:effectLst/>
           <a:extLst>
             <a:ext uri="{91240B29-F687-4f45-9708-019B960494DF}">
-              <a14:hiddenLine xmlns="" xmlns:a14="http://schemas.microsoft.com/office/drawing/2010/main" xmlns:p14="http://schemas.microsoft.com/office/powerpoint/2010/main" xmlns:a16="http://schemas.microsoft.com/office/drawing/2014/main" w="9525">
+              <a14:hiddenLine xmlns:a16="http://schemas.microsoft.com/office/drawing/2014/main" xmlns:p14="http://schemas.microsoft.com/office/powerpoint/2010/main" xmlns:a14="http://schemas.microsoft.com/office/drawing/2010/main" xmlns="" w="9525">
                 <a:solidFill>
                   <a:srgbClr val="000000"/>
                 </a:solidFill>
@@ -13716,6 +13767,21 @@
 </file>
 
 <file path=customXml/item1.xml><?xml version="1.0" encoding="utf-8"?>
+<p:properties xmlns:p="http://schemas.microsoft.com/office/2006/metadata/properties" xmlns:xsi="http://www.w3.org/2001/XMLSchema-instance" xmlns:pc="http://schemas.microsoft.com/office/infopath/2007/PartnerControls">
+  <documentManagement/>
+</p:properties>
+</file>
+
+<file path=customXml/item2.xml><?xml version="1.0" encoding="utf-8"?>
+<?mso-contentType ?>
+<FormTemplates xmlns="http://schemas.microsoft.com/sharepoint/v3/contenttype/forms">
+  <Display>DocumentLibraryForm</Display>
+  <Edit>DocumentLibraryForm</Edit>
+  <New>DocumentLibraryForm</New>
+</FormTemplates>
+</file>
+
+<file path=customXml/item3.xml><?xml version="1.0" encoding="utf-8"?>
 <ct:contentTypeSchema xmlns:ct="http://schemas.microsoft.com/office/2006/metadata/contentType" xmlns:ma="http://schemas.microsoft.com/office/2006/metadata/properties/metaAttributes" ct:_="" ma:_="" ma:contentTypeName="Document" ma:contentTypeID="0x010100CF4A303E319FD944808A3F288FE5DDF7" ma:contentTypeVersion="10" ma:contentTypeDescription="Crée un document." ma:contentTypeScope="" ma:versionID="14564fae3202eb4bcd3910b6907b945c">
   <xsd:schema xmlns:xsd="http://www.w3.org/2001/XMLSchema" xmlns:xs="http://www.w3.org/2001/XMLSchema" xmlns:p="http://schemas.microsoft.com/office/2006/metadata/properties" xmlns:ns3="6b854832-f444-4f51-aa95-8d71f60bf0ab" xmlns:ns4="5ad3b809-77c7-494f-98a9-9d0a32803dcd" targetNamespace="http://schemas.microsoft.com/office/2006/metadata/properties" ma:root="true" ma:fieldsID="70b6269da4170888777c4a6945f67cbe" ns3:_="" ns4:_="">
     <xsd:import namespace="6b854832-f444-4f51-aa95-8d71f60bf0ab"/>
@@ -13918,22 +13984,32 @@
 </ct:contentTypeSchema>
 </file>
 
-<file path=customXml/item2.xml><?xml version="1.0" encoding="utf-8"?>
-<?mso-contentType ?>
-<FormTemplates xmlns="http://schemas.microsoft.com/sharepoint/v3/contenttype/forms">
-  <Display>DocumentLibraryForm</Display>
-  <Edit>DocumentLibraryForm</Edit>
-  <New>DocumentLibraryForm</New>
-</FormTemplates>
+<file path=customXml/itemProps1.xml><?xml version="1.0" encoding="utf-8"?>
+<ds:datastoreItem xmlns:ds="http://schemas.openxmlformats.org/officeDocument/2006/customXml" ds:itemID="{AAB76794-074A-4561-98CD-F65E0623B4D3}">
+  <ds:schemaRefs>
+    <ds:schemaRef ds:uri="http://schemas.microsoft.com/office/2006/metadata/properties"/>
+    <ds:schemaRef ds:uri="http://schemas.openxmlformats.org/package/2006/metadata/core-properties"/>
+    <ds:schemaRef ds:uri="http://schemas.microsoft.com/office/2006/documentManagement/types"/>
+    <ds:schemaRef ds:uri="http://purl.org/dc/terms/"/>
+    <ds:schemaRef ds:uri="http://www.w3.org/XML/1998/namespace"/>
+    <ds:schemaRef ds:uri="http://schemas.microsoft.com/office/infopath/2007/PartnerControls"/>
+    <ds:schemaRef ds:uri="5ad3b809-77c7-494f-98a9-9d0a32803dcd"/>
+    <ds:schemaRef ds:uri="6b854832-f444-4f51-aa95-8d71f60bf0ab"/>
+    <ds:schemaRef ds:uri="http://purl.org/dc/dcmitype/"/>
+    <ds:schemaRef ds:uri="http://purl.org/dc/elements/1.1/"/>
+  </ds:schemaRefs>
+</ds:datastoreItem>
 </file>
 
-<file path=customXml/item3.xml><?xml version="1.0" encoding="utf-8"?>
-<p:properties xmlns:p="http://schemas.microsoft.com/office/2006/metadata/properties" xmlns:xsi="http://www.w3.org/2001/XMLSchema-instance" xmlns:pc="http://schemas.microsoft.com/office/infopath/2007/PartnerControls">
-  <documentManagement/>
-</p:properties>
+<file path=customXml/itemProps2.xml><?xml version="1.0" encoding="utf-8"?>
+<ds:datastoreItem xmlns:ds="http://schemas.openxmlformats.org/officeDocument/2006/customXml" ds:itemID="{F5317CD0-3153-4122-B1C0-FA22AC85FC96}">
+  <ds:schemaRefs>
+    <ds:schemaRef ds:uri="http://schemas.microsoft.com/sharepoint/v3/contenttype/forms"/>
+  </ds:schemaRefs>
+</ds:datastoreItem>
 </file>
 
-<file path=customXml/itemProps1.xml><?xml version="1.0" encoding="utf-8"?>
+<file path=customXml/itemProps3.xml><?xml version="1.0" encoding="utf-8"?>
 <ds:datastoreItem xmlns:ds="http://schemas.openxmlformats.org/officeDocument/2006/customXml" ds:itemID="{E9CD285C-45E4-46DF-A42D-F938C832EF6C}">
   <ds:schemaRefs>
     <ds:schemaRef ds:uri="http://schemas.microsoft.com/office/2006/metadata/contentType"/>
@@ -13950,29 +14026,4 @@
     <ds:schemaRef ds:uri="http://schemas.microsoft.com/internal/obd"/>
   </ds:schemaRefs>
 </ds:datastoreItem>
-</file>
-
-<file path=customXml/itemProps2.xml><?xml version="1.0" encoding="utf-8"?>
-<ds:datastoreItem xmlns:ds="http://schemas.openxmlformats.org/officeDocument/2006/customXml" ds:itemID="{F5317CD0-3153-4122-B1C0-FA22AC85FC96}">
-  <ds:schemaRefs>
-    <ds:schemaRef ds:uri="http://schemas.microsoft.com/sharepoint/v3/contenttype/forms"/>
-  </ds:schemaRefs>
-</ds:datastoreItem>
-</file>
-
-<file path=customXml/itemProps3.xml><?xml version="1.0" encoding="utf-8"?>
-<ds:datastoreItem xmlns:ds="http://schemas.openxmlformats.org/officeDocument/2006/customXml" ds:itemID="{AAB76794-074A-4561-98CD-F65E0623B4D3}">
-  <ds:schemaRefs>
-    <ds:schemaRef ds:uri="http://schemas.microsoft.com/office/2006/metadata/properties"/>
-    <ds:schemaRef ds:uri="http://schemas.openxmlformats.org/package/2006/metadata/core-properties"/>
-    <ds:schemaRef ds:uri="http://schemas.microsoft.com/office/2006/documentManagement/types"/>
-    <ds:schemaRef ds:uri="http://purl.org/dc/terms/"/>
-    <ds:schemaRef ds:uri="http://www.w3.org/XML/1998/namespace"/>
-    <ds:schemaRef ds:uri="http://schemas.microsoft.com/office/infopath/2007/PartnerControls"/>
-    <ds:schemaRef ds:uri="5ad3b809-77c7-494f-98a9-9d0a32803dcd"/>
-    <ds:schemaRef ds:uri="6b854832-f444-4f51-aa95-8d71f60bf0ab"/>
-    <ds:schemaRef ds:uri="http://purl.org/dc/dcmitype/"/>
-    <ds:schemaRef ds:uri="http://purl.org/dc/elements/1.1/"/>
-  </ds:schemaRefs>
-</ds:datastoreItem>
 </file>
</xml_diff>